<commit_message>
Adding WASD, changing Esc and abstract
Changed poster and stuffs
</commit_message>
<xml_diff>
--- a/utilites/Poster.pptx
+++ b/utilites/Poster.pptx
@@ -211,7 +211,7 @@
           <a:p>
             <a:fld id="{38CA0028-D3D7-443F-9CEC-1AD6E684B0FD}" type="datetimeFigureOut">
               <a:rPr lang="en-US" smtClean="0"/>
-              <a:t>6/24/2016</a:t>
+              <a:t>6/25/2016</a:t>
             </a:fld>
             <a:endParaRPr lang="en-US"/>
           </a:p>
@@ -376,7 +376,7 @@
           <a:p>
             <a:fld id="{F56B935D-9D29-4E80-A7CA-9313B2779802}" type="datetimeFigureOut">
               <a:rPr lang="en-US" smtClean="0"/>
-              <a:t>6/24/2016</a:t>
+              <a:t>6/25/2016</a:t>
             </a:fld>
             <a:endParaRPr lang="en-US"/>
           </a:p>
@@ -911,7 +911,7 @@
             <a:fld id="{98F9A2EE-9653-4275-B13F-2F0E87C3BA8F}" type="datetimeFigureOut">
               <a:rPr lang="en-US" smtClean="0"/>
               <a:pPr/>
-              <a:t>6/24/2016</a:t>
+              <a:t>6/25/2016</a:t>
             </a:fld>
             <a:endParaRPr lang="en-US"/>
           </a:p>
@@ -1076,7 +1076,7 @@
             <a:fld id="{98F9A2EE-9653-4275-B13F-2F0E87C3BA8F}" type="datetimeFigureOut">
               <a:rPr lang="en-US" smtClean="0"/>
               <a:pPr/>
-              <a:t>6/24/2016</a:t>
+              <a:t>6/25/2016</a:t>
             </a:fld>
             <a:endParaRPr lang="en-US"/>
           </a:p>
@@ -1251,7 +1251,7 @@
             <a:fld id="{98F9A2EE-9653-4275-B13F-2F0E87C3BA8F}" type="datetimeFigureOut">
               <a:rPr lang="en-US" smtClean="0"/>
               <a:pPr/>
-              <a:t>6/24/2016</a:t>
+              <a:t>6/25/2016</a:t>
             </a:fld>
             <a:endParaRPr lang="en-US"/>
           </a:p>
@@ -1416,7 +1416,7 @@
             <a:fld id="{98F9A2EE-9653-4275-B13F-2F0E87C3BA8F}" type="datetimeFigureOut">
               <a:rPr lang="en-US" smtClean="0"/>
               <a:pPr/>
-              <a:t>6/24/2016</a:t>
+              <a:t>6/25/2016</a:t>
             </a:fld>
             <a:endParaRPr lang="en-US"/>
           </a:p>
@@ -1658,7 +1658,7 @@
             <a:fld id="{98F9A2EE-9653-4275-B13F-2F0E87C3BA8F}" type="datetimeFigureOut">
               <a:rPr lang="en-US" smtClean="0"/>
               <a:pPr/>
-              <a:t>6/24/2016</a:t>
+              <a:t>6/25/2016</a:t>
             </a:fld>
             <a:endParaRPr lang="en-US"/>
           </a:p>
@@ -1940,7 +1940,7 @@
             <a:fld id="{98F9A2EE-9653-4275-B13F-2F0E87C3BA8F}" type="datetimeFigureOut">
               <a:rPr lang="en-US" smtClean="0"/>
               <a:pPr/>
-              <a:t>6/24/2016</a:t>
+              <a:t>6/25/2016</a:t>
             </a:fld>
             <a:endParaRPr lang="en-US"/>
           </a:p>
@@ -2356,7 +2356,7 @@
             <a:fld id="{98F9A2EE-9653-4275-B13F-2F0E87C3BA8F}" type="datetimeFigureOut">
               <a:rPr lang="en-US" smtClean="0"/>
               <a:pPr/>
-              <a:t>6/24/2016</a:t>
+              <a:t>6/25/2016</a:t>
             </a:fld>
             <a:endParaRPr lang="en-US"/>
           </a:p>
@@ -2470,7 +2470,7 @@
             <a:fld id="{98F9A2EE-9653-4275-B13F-2F0E87C3BA8F}" type="datetimeFigureOut">
               <a:rPr lang="en-US" smtClean="0"/>
               <a:pPr/>
-              <a:t>6/24/2016</a:t>
+              <a:t>6/25/2016</a:t>
             </a:fld>
             <a:endParaRPr lang="en-US"/>
           </a:p>
@@ -2562,7 +2562,7 @@
             <a:fld id="{98F9A2EE-9653-4275-B13F-2F0E87C3BA8F}" type="datetimeFigureOut">
               <a:rPr lang="en-US" smtClean="0"/>
               <a:pPr/>
-              <a:t>6/24/2016</a:t>
+              <a:t>6/25/2016</a:t>
             </a:fld>
             <a:endParaRPr lang="en-US"/>
           </a:p>
@@ -2834,7 +2834,7 @@
             <a:fld id="{98F9A2EE-9653-4275-B13F-2F0E87C3BA8F}" type="datetimeFigureOut">
               <a:rPr lang="en-US" smtClean="0"/>
               <a:pPr/>
-              <a:t>6/24/2016</a:t>
+              <a:t>6/25/2016</a:t>
             </a:fld>
             <a:endParaRPr lang="en-US"/>
           </a:p>
@@ -3083,7 +3083,7 @@
             <a:fld id="{98F9A2EE-9653-4275-B13F-2F0E87C3BA8F}" type="datetimeFigureOut">
               <a:rPr lang="en-US" smtClean="0"/>
               <a:pPr/>
-              <a:t>6/24/2016</a:t>
+              <a:t>6/25/2016</a:t>
             </a:fld>
             <a:endParaRPr lang="en-US"/>
           </a:p>
@@ -3291,7 +3291,7 @@
             <a:fld id="{98F9A2EE-9653-4275-B13F-2F0E87C3BA8F}" type="datetimeFigureOut">
               <a:rPr lang="en-US" smtClean="0"/>
               <a:pPr/>
-              <a:t>6/24/2016</a:t>
+              <a:t>6/25/2016</a:t>
             </a:fld>
             <a:endParaRPr lang="en-US"/>
           </a:p>
@@ -3780,9 +3780,7 @@
           <a:prstGeom prst="rect">
             <a:avLst/>
           </a:prstGeom>
-          <a:solidFill>
-            <a:schemeClr val="tx1"/>
-          </a:solidFill>
+          <a:noFill/>
         </p:spPr>
         <p:txBody>
           <a:bodyPr wrap="square" rtlCol="0">
@@ -3823,9 +3821,7 @@
           <a:prstGeom prst="rect">
             <a:avLst/>
           </a:prstGeom>
-          <a:solidFill>
-            <a:schemeClr val="tx1"/>
-          </a:solidFill>
+          <a:noFill/>
         </p:spPr>
         <p:txBody>
           <a:bodyPr wrap="square" rtlCol="0">
@@ -3909,9 +3905,7 @@
           <a:prstGeom prst="rect">
             <a:avLst/>
           </a:prstGeom>
-          <a:solidFill>
-            <a:schemeClr val="tx1"/>
-          </a:solidFill>
+          <a:noFill/>
         </p:spPr>
         <p:txBody>
           <a:bodyPr wrap="square" rtlCol="0">
@@ -4061,9 +4055,7 @@
           <a:prstGeom prst="rect">
             <a:avLst/>
           </a:prstGeom>
-          <a:solidFill>
-            <a:schemeClr val="tx1"/>
-          </a:solidFill>
+          <a:noFill/>
         </p:spPr>
         <p:txBody>
           <a:bodyPr wrap="square" rtlCol="0">
@@ -4170,9 +4162,7 @@
           <a:prstGeom prst="rect">
             <a:avLst/>
           </a:prstGeom>
-          <a:solidFill>
-            <a:schemeClr val="tx1"/>
-          </a:solidFill>
+          <a:noFill/>
         </p:spPr>
         <p:txBody>
           <a:bodyPr wrap="square" rtlCol="0">

</xml_diff>